<commit_message>
Arreglado diseño del proyecto
</commit_message>
<xml_diff>
--- a/Documentación/draft design/bocetos estructura/design.pptx
+++ b/Documentación/draft design/bocetos estructura/design.pptx
@@ -3333,10 +3333,10 @@
       </p:grpSpPr>
       <p:grpSp>
         <p:nvGrpSpPr>
-          <p:cNvPr id="9" name="Grupo 8">
-            <a:extLst>
-              <a:ext uri="{FF2B5EF4-FFF2-40B4-BE49-F238E27FC236}">
-                <a16:creationId xmlns:a16="http://schemas.microsoft.com/office/drawing/2014/main" id="{127DE67C-23A8-432C-A3A5-B26690291335}"/>
+          <p:cNvPr id="3" name="Grupo 2">
+            <a:extLst>
+              <a:ext uri="{FF2B5EF4-FFF2-40B4-BE49-F238E27FC236}">
+                <a16:creationId xmlns:a16="http://schemas.microsoft.com/office/drawing/2014/main" id="{963ADC5C-43B1-4F96-A5DD-8B606D96570D}"/>
               </a:ext>
             </a:extLst>
           </p:cNvPr>
@@ -3346,9 +3346,9 @@
         <p:grpSpPr>
           <a:xfrm>
             <a:off x="4027165" y="1321199"/>
-            <a:ext cx="5199957" cy="4832236"/>
+            <a:ext cx="5051621" cy="4832236"/>
             <a:chOff x="4027165" y="1321199"/>
-            <a:chExt cx="5199957" cy="4832236"/>
+            <a:chExt cx="5051621" cy="4832236"/>
           </a:xfrm>
         </p:grpSpPr>
         <p:grpSp>
@@ -3504,8 +3504,8 @@
           </p:nvCxnSpPr>
           <p:spPr>
             <a:xfrm flipH="1">
-              <a:off x="7829637" y="4583310"/>
-              <a:ext cx="803284" cy="732519"/>
+              <a:off x="7829637" y="4447302"/>
+              <a:ext cx="654948" cy="868527"/>
             </a:xfrm>
             <a:prstGeom prst="straightConnector1">
               <a:avLst/>
@@ -4394,9 +4394,9 @@
             <p:nvPr/>
           </p:nvCxnSpPr>
           <p:spPr>
-            <a:xfrm flipV="1">
-              <a:off x="6855360" y="2798311"/>
-              <a:ext cx="416986" cy="33556"/>
+            <a:xfrm>
+              <a:off x="6855360" y="2831867"/>
+              <a:ext cx="283731" cy="291803"/>
             </a:xfrm>
             <a:prstGeom prst="straightConnector1">
               <a:avLst/>
@@ -4434,7 +4434,7 @@
           </p:nvGrpSpPr>
           <p:grpSpPr>
             <a:xfrm>
-              <a:off x="6982973" y="2487918"/>
+              <a:off x="6849718" y="2813277"/>
               <a:ext cx="1132426" cy="943951"/>
               <a:chOff x="2747442" y="3429000"/>
               <a:chExt cx="1132426" cy="943951"/>
@@ -4663,7 +4663,7 @@
           </p:nvGrpSpPr>
           <p:grpSpPr>
             <a:xfrm>
-              <a:off x="8038719" y="3565234"/>
+              <a:off x="7890383" y="3429226"/>
               <a:ext cx="1188403" cy="1018076"/>
               <a:chOff x="4706629" y="604008"/>
               <a:chExt cx="1188403" cy="1018076"/>
@@ -4753,15 +4753,15 @@
             </p:cNvPr>
             <p:cNvCxnSpPr>
               <a:cxnSpLocks/>
-              <a:stCxn id="75" idx="3"/>
+              <a:stCxn id="49" idx="3"/>
               <a:endCxn id="88" idx="0"/>
             </p:cNvCxnSpPr>
             <p:nvPr/>
           </p:nvCxnSpPr>
           <p:spPr>
             <a:xfrm>
-              <a:off x="7826020" y="2798311"/>
-              <a:ext cx="807913" cy="766923"/>
+              <a:off x="6833524" y="1631592"/>
+              <a:ext cx="1652073" cy="1797634"/>
             </a:xfrm>
             <a:prstGeom prst="straightConnector1">
               <a:avLst/>
@@ -4802,9 +4802,9 @@
             <p:nvPr/>
           </p:nvCxnSpPr>
           <p:spPr>
-            <a:xfrm flipV="1">
-              <a:off x="7418577" y="4540554"/>
-              <a:ext cx="147706" cy="288713"/>
+            <a:xfrm flipH="1" flipV="1">
+              <a:off x="7385103" y="4635014"/>
+              <a:ext cx="33474" cy="194253"/>
             </a:xfrm>
             <a:prstGeom prst="straightConnector1">
               <a:avLst/>
@@ -4842,7 +4842,7 @@
           </p:nvGrpSpPr>
           <p:grpSpPr>
             <a:xfrm>
-              <a:off x="7053258" y="3705286"/>
+              <a:off x="6872078" y="3799746"/>
               <a:ext cx="1026050" cy="835268"/>
               <a:chOff x="9921976" y="1886717"/>
               <a:chExt cx="1026050" cy="835268"/>
@@ -4939,8 +4939,8 @@
           </p:nvCxnSpPr>
           <p:spPr>
             <a:xfrm flipV="1">
-              <a:off x="7775100" y="3909183"/>
-              <a:ext cx="556829" cy="52155"/>
+              <a:off x="7593920" y="3773175"/>
+              <a:ext cx="589673" cy="282623"/>
             </a:xfrm>
             <a:prstGeom prst="straightConnector1">
               <a:avLst/>

</xml_diff>